<commit_message>
Updated the intro ML to better describe expert systems
</commit_message>
<xml_diff>
--- a/lectures/CourseAdmin.pptx
+++ b/lectures/CourseAdmin.pptx
@@ -5,21 +5,24 @@
     <p:sldMasterId id="2147483648" r:id="rId1"/>
   </p:sldMasterIdLst>
   <p:notesMasterIdLst>
-    <p:notesMasterId r:id="rId14"/>
+    <p:notesMasterId r:id="rId17"/>
   </p:notesMasterIdLst>
   <p:sldIdLst>
     <p:sldId id="258" r:id="rId2"/>
-    <p:sldId id="270" r:id="rId3"/>
-    <p:sldId id="264" r:id="rId4"/>
-    <p:sldId id="259" r:id="rId5"/>
-    <p:sldId id="265" r:id="rId6"/>
-    <p:sldId id="260" r:id="rId7"/>
-    <p:sldId id="261" r:id="rId8"/>
-    <p:sldId id="266" r:id="rId9"/>
-    <p:sldId id="263" r:id="rId10"/>
-    <p:sldId id="269" r:id="rId11"/>
-    <p:sldId id="267" r:id="rId12"/>
-    <p:sldId id="268" r:id="rId13"/>
+    <p:sldId id="271" r:id="rId3"/>
+    <p:sldId id="270" r:id="rId4"/>
+    <p:sldId id="264" r:id="rId5"/>
+    <p:sldId id="259" r:id="rId6"/>
+    <p:sldId id="273" r:id="rId7"/>
+    <p:sldId id="265" r:id="rId8"/>
+    <p:sldId id="260" r:id="rId9"/>
+    <p:sldId id="261" r:id="rId10"/>
+    <p:sldId id="266" r:id="rId11"/>
+    <p:sldId id="263" r:id="rId12"/>
+    <p:sldId id="272" r:id="rId13"/>
+    <p:sldId id="269" r:id="rId14"/>
+    <p:sldId id="267" r:id="rId15"/>
+    <p:sldId id="268" r:id="rId16"/>
   </p:sldIdLst>
   <p:sldSz cx="12192000" cy="6858000"/>
   <p:notesSz cx="7315200" cy="9601200"/>
@@ -137,10 +140,6 @@
 </p:presentation>
 </file>
 
-<file path=ppt/revisionInfo.xml><?xml version="1.0" encoding="utf-8"?>
-<p1510:revInfo xmlns:a="http://schemas.openxmlformats.org/drawingml/2006/main" xmlns:r="http://schemas.openxmlformats.org/officeDocument/2006/relationships" xmlns:p1510="http://schemas.microsoft.com/office/powerpoint/2015/10/main"/>
-</file>
-
 <file path=ppt/notesMasters/notesMaster1.xml><?xml version="1.0" encoding="utf-8"?>
 <p:notesMaster xmlns:a="http://schemas.openxmlformats.org/drawingml/2006/main" xmlns:r="http://schemas.openxmlformats.org/officeDocument/2006/relationships" xmlns:p="http://schemas.openxmlformats.org/presentationml/2006/main">
   <p:cSld>
@@ -223,7 +222,7 @@
           <a:p>
             <a:fld id="{B7D6DDD3-D7E9-488B-B626-1E8285E424D8}" type="datetimeFigureOut">
               <a:rPr lang="en-US" smtClean="0"/>
-              <a:t>12/25/2017</a:t>
+              <a:t>9/4/2018</a:t>
             </a:fld>
             <a:endParaRPr lang="en-US"/>
           </a:p>
@@ -4105,6 +4104,637 @@
       </p:grpSpPr>
       <p:sp>
         <p:nvSpPr>
+          <p:cNvPr id="2" name="Title 1"/>
+          <p:cNvSpPr>
+            <a:spLocks noGrp="1"/>
+          </p:cNvSpPr>
+          <p:nvPr>
+            <p:ph type="title"/>
+          </p:nvPr>
+        </p:nvSpPr>
+        <p:spPr/>
+        <p:txBody>
+          <a:bodyPr/>
+          <a:lstStyle/>
+          <a:p>
+            <a:r>
+              <a:rPr lang="en-US" dirty="0"/>
+              <a:t>Grading:  Graduate</a:t>
+            </a:r>
+          </a:p>
+        </p:txBody>
+      </p:sp>
+      <p:sp>
+        <p:nvSpPr>
+          <p:cNvPr id="3" name="Content Placeholder 2"/>
+          <p:cNvSpPr>
+            <a:spLocks noGrp="1"/>
+          </p:cNvSpPr>
+          <p:nvPr>
+            <p:ph idx="1"/>
+          </p:nvPr>
+        </p:nvSpPr>
+        <p:spPr/>
+        <p:txBody>
+          <a:bodyPr>
+            <a:normAutofit/>
+          </a:bodyPr>
+          <a:lstStyle/>
+          <a:p>
+            <a:r>
+              <a:rPr lang="en-US" dirty="0"/>
+              <a:t>Midterm 35%, Final 35%, Labs / HW 30%</a:t>
+            </a:r>
+          </a:p>
+          <a:p>
+            <a:pPr lvl="1"/>
+            <a:r>
+              <a:rPr lang="en-US" dirty="0"/>
+              <a:t>Optional project:  Up to 20%</a:t>
+            </a:r>
+          </a:p>
+          <a:p>
+            <a:r>
+              <a:rPr lang="en-US" dirty="0"/>
+              <a:t>Labs:  Simple python exercises</a:t>
+            </a:r>
+          </a:p>
+          <a:p>
+            <a:pPr lvl="1"/>
+            <a:r>
+              <a:rPr lang="en-US" dirty="0"/>
+              <a:t>Given as </a:t>
+            </a:r>
+            <a:r>
+              <a:rPr lang="en-US" dirty="0" err="1"/>
+              <a:t>jupyter</a:t>
+            </a:r>
+            <a:r>
+              <a:rPr lang="en-US" dirty="0"/>
+              <a:t> notebook that you complete.</a:t>
+            </a:r>
+          </a:p>
+          <a:p>
+            <a:r>
+              <a:rPr lang="en-US" dirty="0"/>
+              <a:t>Midterms &amp; final</a:t>
+            </a:r>
+          </a:p>
+          <a:p>
+            <a:pPr lvl="1"/>
+            <a:r>
+              <a:rPr lang="en-US" dirty="0"/>
+              <a:t>Each over approx. 6-7 weeks</a:t>
+            </a:r>
+          </a:p>
+          <a:p>
+            <a:pPr lvl="1"/>
+            <a:r>
+              <a:rPr lang="en-US" dirty="0"/>
+              <a:t>Open book but no electronic aids.</a:t>
+            </a:r>
+          </a:p>
+          <a:p>
+            <a:pPr lvl="1"/>
+            <a:r>
+              <a:rPr lang="en-US" dirty="0"/>
+              <a:t>Follows homework and quiz problems + some very basic python questions</a:t>
+            </a:r>
+          </a:p>
+          <a:p>
+            <a:r>
+              <a:rPr lang="en-US" dirty="0"/>
+              <a:t>Optional final project:  </a:t>
+            </a:r>
+          </a:p>
+          <a:p>
+            <a:pPr lvl="1"/>
+            <a:r>
+              <a:rPr lang="en-US" dirty="0"/>
+              <a:t>Use machine learning in some interesting way.</a:t>
+            </a:r>
+          </a:p>
+          <a:p>
+            <a:pPr lvl="1"/>
+            <a:r>
+              <a:rPr lang="en-US" dirty="0"/>
+              <a:t>Must use data and python analysis.</a:t>
+            </a:r>
+          </a:p>
+          <a:p>
+            <a:pPr lvl="1"/>
+            <a:r>
+              <a:rPr lang="en-US" dirty="0"/>
+              <a:t>Provide final report.</a:t>
+            </a:r>
+          </a:p>
+        </p:txBody>
+      </p:sp>
+      <p:sp>
+        <p:nvSpPr>
+          <p:cNvPr id="4" name="Slide Number Placeholder 3"/>
+          <p:cNvSpPr>
+            <a:spLocks noGrp="1"/>
+          </p:cNvSpPr>
+          <p:nvPr>
+            <p:ph type="sldNum" sz="quarter" idx="12"/>
+          </p:nvPr>
+        </p:nvSpPr>
+        <p:spPr/>
+        <p:txBody>
+          <a:bodyPr/>
+          <a:lstStyle/>
+          <a:p>
+            <a:fld id="{629637A9-119A-49DA-BD12-AAC58B377D80}" type="slidenum">
+              <a:rPr lang="en-US" smtClean="0"/>
+              <a:t>10</a:t>
+            </a:fld>
+            <a:endParaRPr lang="en-US" dirty="0"/>
+          </a:p>
+        </p:txBody>
+      </p:sp>
+    </p:spTree>
+    <p:extLst>
+      <p:ext uri="{BB962C8B-B14F-4D97-AF65-F5344CB8AC3E}">
+        <p14:creationId xmlns:p14="http://schemas.microsoft.com/office/powerpoint/2010/main" val="1044182445"/>
+      </p:ext>
+    </p:extLst>
+  </p:cSld>
+  <p:clrMapOvr>
+    <a:masterClrMapping/>
+  </p:clrMapOvr>
+</p:sld>
+</file>
+
+<file path=ppt/slides/slide11.xml><?xml version="1.0" encoding="utf-8"?>
+<p:sld xmlns:a="http://schemas.openxmlformats.org/drawingml/2006/main" xmlns:r="http://schemas.openxmlformats.org/officeDocument/2006/relationships" xmlns:p="http://schemas.openxmlformats.org/presentationml/2006/main">
+  <p:cSld>
+    <p:spTree>
+      <p:nvGrpSpPr>
+        <p:cNvPr id="1" name=""/>
+        <p:cNvGrpSpPr/>
+        <p:nvPr/>
+      </p:nvGrpSpPr>
+      <p:grpSpPr>
+        <a:xfrm>
+          <a:off x="0" y="0"/>
+          <a:ext cx="0" cy="0"/>
+          <a:chOff x="0" y="0"/>
+          <a:chExt cx="0" cy="0"/>
+        </a:xfrm>
+      </p:grpSpPr>
+      <p:sp>
+        <p:nvSpPr>
+          <p:cNvPr id="2" name="Title 1"/>
+          <p:cNvSpPr>
+            <a:spLocks noGrp="1"/>
+          </p:cNvSpPr>
+          <p:nvPr>
+            <p:ph type="title"/>
+          </p:nvPr>
+        </p:nvSpPr>
+        <p:spPr/>
+        <p:txBody>
+          <a:bodyPr/>
+          <a:lstStyle/>
+          <a:p>
+            <a:r>
+              <a:rPr lang="en-US" dirty="0"/>
+              <a:t>Machine Learning Project</a:t>
+            </a:r>
+          </a:p>
+        </p:txBody>
+      </p:sp>
+      <p:sp>
+        <p:nvSpPr>
+          <p:cNvPr id="3" name="Content Placeholder 2"/>
+          <p:cNvSpPr>
+            <a:spLocks noGrp="1"/>
+          </p:cNvSpPr>
+          <p:nvPr>
+            <p:ph idx="1"/>
+          </p:nvPr>
+        </p:nvSpPr>
+        <p:spPr/>
+        <p:txBody>
+          <a:bodyPr>
+            <a:normAutofit lnSpcReduction="10000"/>
+          </a:bodyPr>
+          <a:lstStyle/>
+          <a:p>
+            <a:r>
+              <a:rPr lang="en-US" dirty="0"/>
+              <a:t>Perform an interesting machine learning task of your choice</a:t>
+            </a:r>
+          </a:p>
+          <a:p>
+            <a:r>
+              <a:rPr lang="en-US" dirty="0"/>
+              <a:t>Many possible areas:</a:t>
+            </a:r>
+          </a:p>
+          <a:p>
+            <a:pPr lvl="1"/>
+            <a:r>
+              <a:rPr lang="en-US" dirty="0"/>
+              <a:t>Machine vision, brain-computer interfaces, natural language processing, sentiment analysis, …</a:t>
+            </a:r>
+          </a:p>
+          <a:p>
+            <a:pPr lvl="1"/>
+            <a:r>
+              <a:rPr lang="en-US" dirty="0"/>
+              <a:t>Anything that interests you</a:t>
+            </a:r>
+          </a:p>
+          <a:p>
+            <a:r>
+              <a:rPr lang="es-419" dirty="0"/>
+              <a:t>G</a:t>
+            </a:r>
+            <a:r>
+              <a:rPr lang="en-US" dirty="0" err="1"/>
+              <a:t>roups</a:t>
+            </a:r>
+            <a:r>
+              <a:rPr lang="en-US" dirty="0"/>
+              <a:t> of 2 preferred</a:t>
+            </a:r>
+          </a:p>
+          <a:p>
+            <a:pPr lvl="1"/>
+            <a:r>
+              <a:rPr lang="en-US" dirty="0"/>
+              <a:t>In NYU Classes, join a group “project1, project2, …”  </a:t>
+            </a:r>
+          </a:p>
+          <a:p>
+            <a:pPr lvl="1"/>
+            <a:r>
+              <a:rPr lang="en-US" dirty="0"/>
+              <a:t>Submit all material as that group</a:t>
+            </a:r>
+          </a:p>
+          <a:p>
+            <a:r>
+              <a:rPr lang="en-US" dirty="0"/>
+              <a:t>Use real data</a:t>
+            </a:r>
+          </a:p>
+          <a:p>
+            <a:pPr lvl="1"/>
+            <a:r>
+              <a:rPr lang="en-US" dirty="0"/>
+              <a:t>UCI ML repository</a:t>
+            </a:r>
+          </a:p>
+          <a:p>
+            <a:pPr lvl="1"/>
+            <a:r>
+              <a:rPr lang="en-US" dirty="0"/>
+              <a:t>Google </a:t>
+            </a:r>
+            <a:r>
+              <a:rPr lang="en-US" dirty="0" err="1"/>
+              <a:t>BigQuery</a:t>
+            </a:r>
+            <a:r>
+              <a:rPr lang="en-US" dirty="0"/>
+              <a:t> data </a:t>
+            </a:r>
+          </a:p>
+          <a:p>
+            <a:r>
+              <a:rPr lang="en-US" dirty="0"/>
+              <a:t>Write code</a:t>
+            </a:r>
+          </a:p>
+          <a:p>
+            <a:r>
+              <a:rPr lang="en-US" dirty="0"/>
+              <a:t>Place all material in a </a:t>
+            </a:r>
+            <a:r>
+              <a:rPr lang="en-US" dirty="0" err="1"/>
+              <a:t>github</a:t>
+            </a:r>
+            <a:r>
+              <a:rPr lang="en-US" dirty="0"/>
+              <a:t> repo (including documentation) and submit only </a:t>
+            </a:r>
+            <a:r>
+              <a:rPr lang="en-US" dirty="0" err="1"/>
+              <a:t>github</a:t>
+            </a:r>
+            <a:r>
+              <a:rPr lang="en-US" dirty="0"/>
+              <a:t> repo</a:t>
+            </a:r>
+          </a:p>
+          <a:p>
+            <a:endParaRPr lang="en-US" dirty="0"/>
+          </a:p>
+        </p:txBody>
+      </p:sp>
+      <p:sp>
+        <p:nvSpPr>
+          <p:cNvPr id="4" name="Slide Number Placeholder 3"/>
+          <p:cNvSpPr>
+            <a:spLocks noGrp="1"/>
+          </p:cNvSpPr>
+          <p:nvPr>
+            <p:ph type="sldNum" sz="quarter" idx="12"/>
+          </p:nvPr>
+        </p:nvSpPr>
+        <p:spPr/>
+        <p:txBody>
+          <a:bodyPr/>
+          <a:lstStyle/>
+          <a:p>
+            <a:fld id="{629637A9-119A-49DA-BD12-AAC58B377D80}" type="slidenum">
+              <a:rPr lang="en-US" smtClean="0"/>
+              <a:t>11</a:t>
+            </a:fld>
+            <a:endParaRPr lang="en-US" dirty="0"/>
+          </a:p>
+        </p:txBody>
+      </p:sp>
+    </p:spTree>
+    <p:extLst>
+      <p:ext uri="{BB962C8B-B14F-4D97-AF65-F5344CB8AC3E}">
+        <p14:creationId xmlns:p14="http://schemas.microsoft.com/office/powerpoint/2010/main" val="3728933757"/>
+      </p:ext>
+    </p:extLst>
+  </p:cSld>
+  <p:clrMapOvr>
+    <a:masterClrMapping/>
+  </p:clrMapOvr>
+</p:sld>
+</file>
+
+<file path=ppt/slides/slide12.xml><?xml version="1.0" encoding="utf-8"?>
+<p:sld xmlns:a="http://schemas.openxmlformats.org/drawingml/2006/main" xmlns:r="http://schemas.openxmlformats.org/officeDocument/2006/relationships" xmlns:p="http://schemas.openxmlformats.org/presentationml/2006/main">
+  <p:cSld>
+    <p:spTree>
+      <p:nvGrpSpPr>
+        <p:cNvPr id="1" name=""/>
+        <p:cNvGrpSpPr/>
+        <p:nvPr/>
+      </p:nvGrpSpPr>
+      <p:grpSpPr>
+        <a:xfrm>
+          <a:off x="0" y="0"/>
+          <a:ext cx="0" cy="0"/>
+          <a:chOff x="0" y="0"/>
+          <a:chExt cx="0" cy="0"/>
+        </a:xfrm>
+      </p:grpSpPr>
+      <p:sp>
+        <p:nvSpPr>
+          <p:cNvPr id="2" name="Title 1">
+            <a:extLst>
+              <a:ext uri="{FF2B5EF4-FFF2-40B4-BE49-F238E27FC236}">
+                <a16:creationId xmlns:a16="http://schemas.microsoft.com/office/drawing/2014/main" id="{08A83E15-2151-47C0-9EF1-ADA322027CCE}"/>
+              </a:ext>
+            </a:extLst>
+          </p:cNvPr>
+          <p:cNvSpPr>
+            <a:spLocks noGrp="1"/>
+          </p:cNvSpPr>
+          <p:nvPr>
+            <p:ph type="title"/>
+          </p:nvPr>
+        </p:nvSpPr>
+        <p:spPr/>
+        <p:txBody>
+          <a:bodyPr/>
+          <a:lstStyle/>
+          <a:p>
+            <a:r>
+              <a:rPr lang="en-US" dirty="0"/>
+              <a:t>Project Grading	</a:t>
+            </a:r>
+          </a:p>
+        </p:txBody>
+      </p:sp>
+      <p:sp>
+        <p:nvSpPr>
+          <p:cNvPr id="3" name="Content Placeholder 2">
+            <a:extLst>
+              <a:ext uri="{FF2B5EF4-FFF2-40B4-BE49-F238E27FC236}">
+                <a16:creationId xmlns:a16="http://schemas.microsoft.com/office/drawing/2014/main" id="{98DBC5B0-0D3B-4804-AA22-77009216687E}"/>
+              </a:ext>
+            </a:extLst>
+          </p:cNvPr>
+          <p:cNvSpPr>
+            <a:spLocks noGrp="1"/>
+          </p:cNvSpPr>
+          <p:nvPr>
+            <p:ph idx="1"/>
+          </p:nvPr>
+        </p:nvSpPr>
+        <p:spPr/>
+        <p:txBody>
+          <a:bodyPr>
+            <a:normAutofit lnSpcReduction="10000"/>
+          </a:bodyPr>
+          <a:lstStyle/>
+          <a:p>
+            <a:r>
+              <a:rPr lang="en-US" dirty="0">
+                <a:solidFill>
+                  <a:schemeClr val="accent1">
+                    <a:lumMod val="60000"/>
+                    <a:lumOff val="40000"/>
+                  </a:schemeClr>
+                </a:solidFill>
+              </a:rPr>
+              <a:t>Formulation</a:t>
+            </a:r>
+            <a:endParaRPr lang="en-US" dirty="0"/>
+          </a:p>
+          <a:p>
+            <a:pPr lvl="1"/>
+            <a:r>
+              <a:rPr lang="en-US" dirty="0"/>
+              <a:t>How well did you formulate the problem?  Was it clear?  Was that tied to the right objective?</a:t>
+            </a:r>
+          </a:p>
+          <a:p>
+            <a:r>
+              <a:rPr lang="en-US" dirty="0">
+                <a:solidFill>
+                  <a:schemeClr val="accent1">
+                    <a:lumMod val="60000"/>
+                    <a:lumOff val="40000"/>
+                  </a:schemeClr>
+                </a:solidFill>
+              </a:rPr>
+              <a:t>Approach</a:t>
+            </a:r>
+            <a:endParaRPr lang="en-US" dirty="0"/>
+          </a:p>
+          <a:p>
+            <a:pPr lvl="1"/>
+            <a:r>
+              <a:rPr lang="en-US" dirty="0"/>
+              <a:t>Does your approach properly solve your problem?  Was that made clear?  </a:t>
+            </a:r>
+          </a:p>
+          <a:p>
+            <a:r>
+              <a:rPr lang="en-US" dirty="0">
+                <a:solidFill>
+                  <a:schemeClr val="accent1">
+                    <a:lumMod val="60000"/>
+                    <a:lumOff val="40000"/>
+                  </a:schemeClr>
+                </a:solidFill>
+              </a:rPr>
+              <a:t>Evaluation and Interpretation</a:t>
+            </a:r>
+            <a:endParaRPr lang="en-US" dirty="0"/>
+          </a:p>
+          <a:p>
+            <a:pPr lvl="1"/>
+            <a:r>
+              <a:rPr lang="en-US" dirty="0"/>
+              <a:t>Did you comprehensively test the results?  How well did you select / create the data? </a:t>
+            </a:r>
+          </a:p>
+          <a:p>
+            <a:pPr lvl="1"/>
+            <a:r>
+              <a:rPr lang="en-US" dirty="0"/>
+              <a:t>Did you test against alternative approaches?</a:t>
+            </a:r>
+          </a:p>
+          <a:p>
+            <a:r>
+              <a:rPr lang="en-US" dirty="0">
+                <a:solidFill>
+                  <a:schemeClr val="accent1">
+                    <a:lumMod val="60000"/>
+                    <a:lumOff val="40000"/>
+                  </a:schemeClr>
+                </a:solidFill>
+              </a:rPr>
+              <a:t>Presentation</a:t>
+            </a:r>
+            <a:r>
+              <a:rPr lang="en-US" dirty="0"/>
+              <a:t>  </a:t>
+            </a:r>
+          </a:p>
+          <a:p>
+            <a:pPr lvl="1"/>
+            <a:r>
+              <a:rPr lang="en-US" dirty="0"/>
+              <a:t>Were the ideas clear?  Were all the details conveyed.  Did you highlight the main points?</a:t>
+            </a:r>
+          </a:p>
+          <a:p>
+            <a:pPr lvl="1"/>
+            <a:r>
+              <a:rPr lang="en-US" dirty="0"/>
+              <a:t>You can select a number of formats.  Whatever makes sense.  A </a:t>
+            </a:r>
+            <a:r>
+              <a:rPr lang="en-US" dirty="0" err="1"/>
+              <a:t>github</a:t>
+            </a:r>
+            <a:r>
+              <a:rPr lang="en-US" dirty="0"/>
+              <a:t> page</a:t>
+            </a:r>
+          </a:p>
+          <a:p>
+            <a:r>
+              <a:rPr lang="en-US" dirty="0">
+                <a:solidFill>
+                  <a:schemeClr val="accent1">
+                    <a:lumMod val="60000"/>
+                    <a:lumOff val="40000"/>
+                  </a:schemeClr>
+                </a:solidFill>
+              </a:rPr>
+              <a:t>Bonus</a:t>
+            </a:r>
+          </a:p>
+          <a:p>
+            <a:pPr lvl="1"/>
+            <a:r>
+              <a:rPr lang="en-US" dirty="0">
+                <a:solidFill>
+                  <a:schemeClr val="tx1"/>
+                </a:solidFill>
+              </a:rPr>
+              <a:t>Given for particularly hard / novel research</a:t>
+            </a:r>
+          </a:p>
+        </p:txBody>
+      </p:sp>
+      <p:sp>
+        <p:nvSpPr>
+          <p:cNvPr id="4" name="Slide Number Placeholder 3">
+            <a:extLst>
+              <a:ext uri="{FF2B5EF4-FFF2-40B4-BE49-F238E27FC236}">
+                <a16:creationId xmlns:a16="http://schemas.microsoft.com/office/drawing/2014/main" id="{85FA53A8-2A5E-49EE-88AA-3E008B3D21B1}"/>
+              </a:ext>
+            </a:extLst>
+          </p:cNvPr>
+          <p:cNvSpPr>
+            <a:spLocks noGrp="1"/>
+          </p:cNvSpPr>
+          <p:nvPr>
+            <p:ph type="sldNum" sz="quarter" idx="12"/>
+          </p:nvPr>
+        </p:nvSpPr>
+        <p:spPr/>
+        <p:txBody>
+          <a:bodyPr/>
+          <a:lstStyle/>
+          <a:p>
+            <a:fld id="{629637A9-119A-49DA-BD12-AAC58B377D80}" type="slidenum">
+              <a:rPr lang="en-US" smtClean="0"/>
+              <a:t>12</a:t>
+            </a:fld>
+            <a:endParaRPr lang="en-US" dirty="0"/>
+          </a:p>
+        </p:txBody>
+      </p:sp>
+    </p:spTree>
+    <p:extLst>
+      <p:ext uri="{BB962C8B-B14F-4D97-AF65-F5344CB8AC3E}">
+        <p14:creationId xmlns:p14="http://schemas.microsoft.com/office/powerpoint/2010/main" val="2682996528"/>
+      </p:ext>
+    </p:extLst>
+  </p:cSld>
+  <p:clrMapOvr>
+    <a:masterClrMapping/>
+  </p:clrMapOvr>
+</p:sld>
+</file>
+
+<file path=ppt/slides/slide13.xml><?xml version="1.0" encoding="utf-8"?>
+<p:sld xmlns:a="http://schemas.openxmlformats.org/drawingml/2006/main" xmlns:r="http://schemas.openxmlformats.org/officeDocument/2006/relationships" xmlns:p="http://schemas.openxmlformats.org/presentationml/2006/main">
+  <p:cSld>
+    <p:spTree>
+      <p:nvGrpSpPr>
+        <p:cNvPr id="1" name=""/>
+        <p:cNvGrpSpPr/>
+        <p:nvPr/>
+      </p:nvGrpSpPr>
+      <p:grpSpPr>
+        <a:xfrm>
+          <a:off x="0" y="0"/>
+          <a:ext cx="0" cy="0"/>
+          <a:chOff x="0" y="0"/>
+          <a:chExt cx="0" cy="0"/>
+        </a:xfrm>
+      </p:grpSpPr>
+      <p:sp>
+        <p:nvSpPr>
           <p:cNvPr id="2" name="Title 1">
             <a:extLst>
               <a:ext uri="{FF2B5EF4-FFF2-40B4-BE49-F238E27FC236}">
@@ -4232,7 +4862,7 @@
           <a:p>
             <a:fld id="{629637A9-119A-49DA-BD12-AAC58B377D80}" type="slidenum">
               <a:rPr lang="en-US" smtClean="0"/>
-              <a:t>10</a:t>
+              <a:t>13</a:t>
             </a:fld>
             <a:endParaRPr lang="en-US" dirty="0"/>
           </a:p>
@@ -4281,7 +4911,7 @@
 </p:sld>
 </file>
 
-<file path=ppt/slides/slide11.xml><?xml version="1.0" encoding="utf-8"?>
+<file path=ppt/slides/slide14.xml><?xml version="1.0" encoding="utf-8"?>
 <p:sld xmlns:a="http://schemas.openxmlformats.org/drawingml/2006/main" xmlns:r="http://schemas.openxmlformats.org/officeDocument/2006/relationships" xmlns:p="http://schemas.openxmlformats.org/presentationml/2006/main">
   <p:cSld>
     <p:spTree>
@@ -4483,7 +5113,7 @@
           <a:p>
             <a:fld id="{629637A9-119A-49DA-BD12-AAC58B377D80}" type="slidenum">
               <a:rPr lang="en-US" smtClean="0"/>
-              <a:t>11</a:t>
+              <a:t>14</a:t>
             </a:fld>
             <a:endParaRPr lang="en-US" dirty="0"/>
           </a:p>
@@ -4532,7 +5162,7 @@
 </p:sld>
 </file>
 
-<file path=ppt/slides/slide12.xml><?xml version="1.0" encoding="utf-8"?>
+<file path=ppt/slides/slide15.xml><?xml version="1.0" encoding="utf-8"?>
 <p:sld xmlns:a="http://schemas.openxmlformats.org/drawingml/2006/main" xmlns:r="http://schemas.openxmlformats.org/officeDocument/2006/relationships" xmlns:p="http://schemas.openxmlformats.org/presentationml/2006/main">
   <p:cSld>
     <p:spTree>
@@ -4613,7 +5243,7 @@
             <a:pPr lvl="1"/>
             <a:r>
               <a:rPr lang="en-US" dirty="0"/>
-              <a:t>Make sure you get 3.5</a:t>
+              <a:t>Make sure you get 3.6</a:t>
             </a:r>
           </a:p>
           <a:p>
@@ -4645,6 +5275,14 @@
             <a:r>
               <a:rPr lang="en-US" dirty="0" err="1"/>
               <a:t>Tensorflow</a:t>
+            </a:r>
+            <a:r>
+              <a:rPr lang="en-US" dirty="0"/>
+              <a:t> and </a:t>
+            </a:r>
+            <a:r>
+              <a:rPr lang="en-US" dirty="0" err="1"/>
+              <a:t>Keras</a:t>
             </a:r>
             <a:r>
               <a:rPr lang="en-US" dirty="0"/>
@@ -4720,7 +5358,7 @@
           <a:p>
             <a:fld id="{629637A9-119A-49DA-BD12-AAC58B377D80}" type="slidenum">
               <a:rPr lang="en-US" smtClean="0"/>
-              <a:t>12</a:t>
+              <a:t>15</a:t>
             </a:fld>
             <a:endParaRPr lang="en-US" dirty="0"/>
           </a:p>
@@ -4758,7 +5396,13 @@
       </p:grpSpPr>
       <p:sp>
         <p:nvSpPr>
-          <p:cNvPr id="2" name="Title 1"/>
+          <p:cNvPr id="2" name="Title 1">
+            <a:extLst>
+              <a:ext uri="{FF2B5EF4-FFF2-40B4-BE49-F238E27FC236}">
+                <a16:creationId xmlns:a16="http://schemas.microsoft.com/office/drawing/2014/main" id="{F4ED086D-1C9A-4B43-9F22-05E00BC8D6E8}"/>
+              </a:ext>
+            </a:extLst>
+          </p:cNvPr>
           <p:cNvSpPr>
             <a:spLocks noGrp="1"/>
           </p:cNvSpPr>
@@ -4773,14 +5417,20 @@
           <a:p>
             <a:r>
               <a:rPr lang="en-US" dirty="0"/>
-              <a:t>Course Learning Objectives</a:t>
-            </a:r>
-          </a:p>
-        </p:txBody>
-      </p:sp>
-      <p:sp>
-        <p:nvSpPr>
-          <p:cNvPr id="3" name="Content Placeholder 2"/>
+              <a:t>People	</a:t>
+            </a:r>
+          </a:p>
+        </p:txBody>
+      </p:sp>
+      <p:sp>
+        <p:nvSpPr>
+          <p:cNvPr id="3" name="Content Placeholder 2">
+            <a:extLst>
+              <a:ext uri="{FF2B5EF4-FFF2-40B4-BE49-F238E27FC236}">
+                <a16:creationId xmlns:a16="http://schemas.microsoft.com/office/drawing/2014/main" id="{77F0C1C5-E5D1-4EB5-B957-5E2EEDD7ABE2}"/>
+              </a:ext>
+            </a:extLst>
+          </p:cNvPr>
           <p:cNvSpPr>
             <a:spLocks noGrp="1"/>
           </p:cNvSpPr>
@@ -4795,68 +5445,124 @@
           <a:p>
             <a:r>
               <a:rPr lang="en-US" dirty="0"/>
-              <a:t>Formulate a task as a machine learning problem</a:t>
-            </a:r>
-          </a:p>
-          <a:p>
-            <a:pPr lvl="1"/>
-            <a:r>
-              <a:rPr lang="en-US" dirty="0"/>
-              <a:t>Identify learning objectives, source of data, models, …</a:t>
-            </a:r>
-          </a:p>
-          <a:p>
-            <a:r>
-              <a:rPr lang="en-US" dirty="0"/>
-              <a:t>Load, pre-process and extract features from common data sources </a:t>
-            </a:r>
-          </a:p>
-          <a:p>
-            <a:pPr lvl="1"/>
-            <a:r>
-              <a:rPr lang="en-US" dirty="0"/>
-              <a:t>images, text, audio, …</a:t>
-            </a:r>
-          </a:p>
-          <a:p>
-            <a:r>
-              <a:rPr lang="en-US" dirty="0"/>
-              <a:t>Mathematically describe simple models of the data</a:t>
-            </a:r>
-          </a:p>
-          <a:p>
-            <a:r>
-              <a:rPr lang="en-US" dirty="0"/>
-              <a:t>Fit the models to data and use models for prediction and estimation </a:t>
-            </a:r>
-          </a:p>
-          <a:p>
-            <a:pPr lvl="1"/>
-            <a:r>
-              <a:rPr lang="en-US" dirty="0"/>
-              <a:t>Use common tools</a:t>
-            </a:r>
-          </a:p>
-          <a:p>
-            <a:r>
-              <a:rPr lang="en-US" dirty="0"/>
-              <a:t>Evaluate goodness of fit and refine models</a:t>
-            </a:r>
-          </a:p>
-          <a:p>
-            <a:r>
-              <a:rPr lang="en-US" dirty="0"/>
-              <a:t>Evaluate the performance of methods using statistical techniques</a:t>
-            </a:r>
-          </a:p>
-          <a:p>
-            <a:endParaRPr lang="en-US" dirty="0"/>
-          </a:p>
-        </p:txBody>
-      </p:sp>
-      <p:sp>
-        <p:nvSpPr>
-          <p:cNvPr id="4" name="Slide Number Placeholder 3"/>
+              <a:t>Professor: Sundeep Rangan, </a:t>
+            </a:r>
+            <a:r>
+              <a:rPr lang="en-US" dirty="0">
+                <a:hlinkClick r:id="rId2"/>
+              </a:rPr>
+              <a:t>srangan@nyu.edu</a:t>
+            </a:r>
+            <a:r>
+              <a:rPr lang="en-US" dirty="0"/>
+              <a:t> </a:t>
+            </a:r>
+          </a:p>
+          <a:p>
+            <a:pPr lvl="1"/>
+            <a:r>
+              <a:rPr lang="en-US" dirty="0"/>
+              <a:t>2 MetroTech Center 9.104</a:t>
+            </a:r>
+          </a:p>
+          <a:p>
+            <a:pPr lvl="1"/>
+            <a:r>
+              <a:rPr lang="en-US" dirty="0"/>
+              <a:t>Office Hours:  Tuesdays, 3-5pm</a:t>
+            </a:r>
+          </a:p>
+          <a:p>
+            <a:pPr lvl="1"/>
+            <a:endParaRPr lang="en-US" dirty="0"/>
+          </a:p>
+          <a:p>
+            <a:r>
+              <a:rPr lang="de-DE" dirty="0"/>
+              <a:t>TA:  Chen, </a:t>
+            </a:r>
+            <a:r>
+              <a:rPr lang="de-DE" dirty="0" err="1"/>
+              <a:t>Juntao</a:t>
+            </a:r>
+            <a:r>
+              <a:rPr lang="de-DE" dirty="0"/>
+              <a:t> </a:t>
+            </a:r>
+            <a:r>
+              <a:rPr lang="de-DE" dirty="0">
+                <a:hlinkClick r:id="rId3"/>
+              </a:rPr>
+              <a:t>jc6412@nyu.edu</a:t>
+            </a:r>
+            <a:endParaRPr lang="de-DE" dirty="0"/>
+          </a:p>
+          <a:p>
+            <a:pPr lvl="1"/>
+            <a:r>
+              <a:rPr lang="de-DE" dirty="0"/>
+              <a:t>Office Hours: TBD</a:t>
+            </a:r>
+          </a:p>
+          <a:p>
+            <a:pPr lvl="1"/>
+            <a:r>
+              <a:rPr lang="de-DE" dirty="0" err="1"/>
+              <a:t>Ask</a:t>
+            </a:r>
+            <a:r>
+              <a:rPr lang="de-DE" dirty="0"/>
+              <a:t> </a:t>
+            </a:r>
+            <a:r>
+              <a:rPr lang="de-DE" dirty="0" err="1"/>
+              <a:t>for</a:t>
+            </a:r>
+            <a:r>
+              <a:rPr lang="de-DE" dirty="0"/>
+              <a:t> all </a:t>
+            </a:r>
+            <a:r>
+              <a:rPr lang="de-DE" dirty="0" err="1"/>
+              <a:t>questions</a:t>
+            </a:r>
+            <a:r>
+              <a:rPr lang="de-DE" dirty="0"/>
+              <a:t> </a:t>
+            </a:r>
+            <a:r>
+              <a:rPr lang="de-DE" dirty="0" err="1"/>
+              <a:t>regarding</a:t>
+            </a:r>
+            <a:r>
+              <a:rPr lang="de-DE" dirty="0"/>
+              <a:t> </a:t>
+            </a:r>
+            <a:r>
+              <a:rPr lang="de-DE" dirty="0" err="1"/>
+              <a:t>homeworks</a:t>
+            </a:r>
+            <a:r>
+              <a:rPr lang="de-DE" dirty="0"/>
+              <a:t> and </a:t>
+            </a:r>
+            <a:r>
+              <a:rPr lang="de-DE" dirty="0" err="1"/>
+              <a:t>labs</a:t>
+            </a:r>
+            <a:endParaRPr lang="en-US" dirty="0"/>
+          </a:p>
+        </p:txBody>
+      </p:sp>
+      <p:sp>
+        <p:nvSpPr>
+          <p:cNvPr id="4" name="Slide Number Placeholder 3">
+            <a:extLst>
+              <a:ext uri="{FF2B5EF4-FFF2-40B4-BE49-F238E27FC236}">
+                <a16:creationId xmlns:a16="http://schemas.microsoft.com/office/drawing/2014/main" id="{19B69252-709C-4E31-A546-A53DAAEF3F58}"/>
+              </a:ext>
+            </a:extLst>
+          </p:cNvPr>
           <p:cNvSpPr>
             <a:spLocks noGrp="1"/>
           </p:cNvSpPr>
@@ -4880,7 +5586,7 @@
     </p:spTree>
     <p:extLst>
       <p:ext uri="{BB962C8B-B14F-4D97-AF65-F5344CB8AC3E}">
-        <p14:creationId xmlns:p14="http://schemas.microsoft.com/office/powerpoint/2010/main" val="2266567344"/>
+        <p14:creationId xmlns:p14="http://schemas.microsoft.com/office/powerpoint/2010/main" val="446808800"/>
       </p:ext>
     </p:extLst>
   </p:cSld>
@@ -4909,13 +5615,7 @@
       </p:grpSpPr>
       <p:sp>
         <p:nvSpPr>
-          <p:cNvPr id="2" name="Title 1">
-            <a:extLst>
-              <a:ext uri="{FF2B5EF4-FFF2-40B4-BE49-F238E27FC236}">
-                <a16:creationId xmlns:a16="http://schemas.microsoft.com/office/drawing/2014/main" id="{AF5DE490-1C1E-4041-9F3B-226D8A920E58}"/>
-              </a:ext>
-            </a:extLst>
-          </p:cNvPr>
+          <p:cNvPr id="2" name="Title 1"/>
           <p:cNvSpPr>
             <a:spLocks noGrp="1"/>
           </p:cNvSpPr>
@@ -4930,20 +5630,14 @@
           <a:p>
             <a:r>
               <a:rPr lang="en-US" dirty="0"/>
-              <a:t>Grad vs Undergrad	</a:t>
-            </a:r>
-          </a:p>
-        </p:txBody>
-      </p:sp>
-      <p:sp>
-        <p:nvSpPr>
-          <p:cNvPr id="3" name="Content Placeholder 2">
-            <a:extLst>
-              <a:ext uri="{FF2B5EF4-FFF2-40B4-BE49-F238E27FC236}">
-                <a16:creationId xmlns:a16="http://schemas.microsoft.com/office/drawing/2014/main" id="{707154A5-ADD8-4B2A-8440-D9F053DDAFCC}"/>
-              </a:ext>
-            </a:extLst>
-          </p:cNvPr>
+              <a:t>Course Learning Objectives</a:t>
+            </a:r>
+          </a:p>
+        </p:txBody>
+      </p:sp>
+      <p:sp>
+        <p:nvSpPr>
+          <p:cNvPr id="3" name="Content Placeholder 2"/>
           <p:cNvSpPr>
             <a:spLocks noGrp="1"/>
           </p:cNvSpPr>
@@ -4958,95 +5652,68 @@
           <a:p>
             <a:r>
               <a:rPr lang="en-US" dirty="0"/>
-              <a:t>Class is simultaneously offered at the graduate and undergraduate level</a:t>
-            </a:r>
-          </a:p>
-          <a:p>
-            <a:r>
-              <a:rPr lang="en-US" dirty="0"/>
-              <a:t>Undergrad EE-UY/CSE-UY 4563:  Intro to Machine Learning</a:t>
-            </a:r>
-          </a:p>
-          <a:p>
-            <a:pPr lvl="1"/>
-            <a:r>
-              <a:rPr lang="en-US" dirty="0"/>
-              <a:t>Covers fundamental algorithms and some analysis</a:t>
-            </a:r>
-          </a:p>
-          <a:p>
-            <a:pPr lvl="1"/>
-            <a:r>
-              <a:rPr lang="en-US" dirty="0"/>
-              <a:t>In depth coverage of software tools including python, Google Cloud, </a:t>
-            </a:r>
-            <a:r>
-              <a:rPr lang="en-US" dirty="0" err="1"/>
-              <a:t>Tensorflow</a:t>
-            </a:r>
-            <a:endParaRPr lang="en-US" dirty="0"/>
-          </a:p>
-          <a:p>
-            <a:pPr lvl="1"/>
-            <a:r>
-              <a:rPr lang="en-US" dirty="0"/>
-              <a:t>Python-based lab exercises + mandatory project</a:t>
-            </a:r>
-          </a:p>
-          <a:p>
-            <a:r>
-              <a:rPr lang="en-US" dirty="0"/>
-              <a:t>Grad EL 9123:  Intro to Machine Learning</a:t>
-            </a:r>
-          </a:p>
-          <a:p>
-            <a:pPr lvl="1"/>
-            <a:r>
-              <a:rPr lang="en-US" dirty="0"/>
-              <a:t>More algorithms and more mathematical analysis.  Faster paced.</a:t>
-            </a:r>
-          </a:p>
-          <a:p>
-            <a:pPr lvl="1"/>
-            <a:r>
-              <a:rPr lang="en-US" dirty="0"/>
-              <a:t>Software tools must be learned at home.  Less coverage in class</a:t>
-            </a:r>
-          </a:p>
-          <a:p>
-            <a:pPr lvl="1"/>
-            <a:r>
-              <a:rPr lang="en-US" dirty="0"/>
-              <a:t>Python-based lab exercises + optional project</a:t>
-            </a:r>
-          </a:p>
-          <a:p>
-            <a:r>
-              <a:rPr lang="en-US" dirty="0"/>
-              <a:t>Lecture notes are mostly common with supplementary material for grad students indicated</a:t>
-            </a:r>
-          </a:p>
-          <a:p>
-            <a:r>
-              <a:rPr lang="en-US" dirty="0"/>
-              <a:t>Many labs are common</a:t>
-            </a:r>
-          </a:p>
-          <a:p>
-            <a:pPr lvl="1"/>
-            <a:endParaRPr lang="en-US" dirty="0"/>
-          </a:p>
-        </p:txBody>
-      </p:sp>
-      <p:sp>
-        <p:nvSpPr>
-          <p:cNvPr id="4" name="Slide Number Placeholder 3">
-            <a:extLst>
-              <a:ext uri="{FF2B5EF4-FFF2-40B4-BE49-F238E27FC236}">
-                <a16:creationId xmlns:a16="http://schemas.microsoft.com/office/drawing/2014/main" id="{5EAAA473-4A7A-4E56-A0F3-A86B4C64EB21}"/>
-              </a:ext>
-            </a:extLst>
-          </p:cNvPr>
+              <a:t>Formulate a task as a machine learning problem</a:t>
+            </a:r>
+          </a:p>
+          <a:p>
+            <a:pPr lvl="1"/>
+            <a:r>
+              <a:rPr lang="en-US" dirty="0"/>
+              <a:t>Identify learning objectives, source of data, models, …</a:t>
+            </a:r>
+          </a:p>
+          <a:p>
+            <a:r>
+              <a:rPr lang="en-US" dirty="0"/>
+              <a:t>Load, pre-process and extract features from common data sources </a:t>
+            </a:r>
+          </a:p>
+          <a:p>
+            <a:pPr lvl="1"/>
+            <a:r>
+              <a:rPr lang="en-US" dirty="0"/>
+              <a:t>images, text, audio, …</a:t>
+            </a:r>
+          </a:p>
+          <a:p>
+            <a:r>
+              <a:rPr lang="en-US" dirty="0"/>
+              <a:t>Mathematically describe simple models of the data</a:t>
+            </a:r>
+          </a:p>
+          <a:p>
+            <a:r>
+              <a:rPr lang="en-US" dirty="0"/>
+              <a:t>Fit the models to data and use models for prediction and estimation </a:t>
+            </a:r>
+          </a:p>
+          <a:p>
+            <a:pPr lvl="1"/>
+            <a:r>
+              <a:rPr lang="en-US" dirty="0"/>
+              <a:t>Use common tools</a:t>
+            </a:r>
+          </a:p>
+          <a:p>
+            <a:r>
+              <a:rPr lang="en-US" dirty="0"/>
+              <a:t>Evaluate goodness of fit and refine models</a:t>
+            </a:r>
+          </a:p>
+          <a:p>
+            <a:r>
+              <a:rPr lang="en-US" dirty="0"/>
+              <a:t>Evaluate the performance of methods using statistical techniques</a:t>
+            </a:r>
+          </a:p>
+          <a:p>
+            <a:endParaRPr lang="en-US" dirty="0"/>
+          </a:p>
+        </p:txBody>
+      </p:sp>
+      <p:sp>
+        <p:nvSpPr>
+          <p:cNvPr id="4" name="Slide Number Placeholder 3"/>
           <p:cNvSpPr>
             <a:spLocks noGrp="1"/>
           </p:cNvSpPr>
@@ -5070,7 +5737,7 @@
     </p:spTree>
     <p:extLst>
       <p:ext uri="{BB962C8B-B14F-4D97-AF65-F5344CB8AC3E}">
-        <p14:creationId xmlns:p14="http://schemas.microsoft.com/office/powerpoint/2010/main" val="3747133559"/>
+        <p14:creationId xmlns:p14="http://schemas.microsoft.com/office/powerpoint/2010/main" val="2266567344"/>
       </p:ext>
     </p:extLst>
   </p:cSld>
@@ -5099,7 +5766,13 @@
       </p:grpSpPr>
       <p:sp>
         <p:nvSpPr>
-          <p:cNvPr id="2" name="Title 1"/>
+          <p:cNvPr id="2" name="Title 1">
+            <a:extLst>
+              <a:ext uri="{FF2B5EF4-FFF2-40B4-BE49-F238E27FC236}">
+                <a16:creationId xmlns:a16="http://schemas.microsoft.com/office/drawing/2014/main" id="{AF5DE490-1C1E-4041-9F3B-226D8A920E58}"/>
+              </a:ext>
+            </a:extLst>
+          </p:cNvPr>
           <p:cNvSpPr>
             <a:spLocks noGrp="1"/>
           </p:cNvSpPr>
@@ -5114,14 +5787,20 @@
           <a:p>
             <a:r>
               <a:rPr lang="en-US" dirty="0"/>
-              <a:t>Texts and Other Resources</a:t>
-            </a:r>
-          </a:p>
-        </p:txBody>
-      </p:sp>
-      <p:sp>
-        <p:nvSpPr>
-          <p:cNvPr id="3" name="Content Placeholder 2"/>
+              <a:t>Grad vs Undergrad	</a:t>
+            </a:r>
+          </a:p>
+        </p:txBody>
+      </p:sp>
+      <p:sp>
+        <p:nvSpPr>
+          <p:cNvPr id="3" name="Content Placeholder 2">
+            <a:extLst>
+              <a:ext uri="{FF2B5EF4-FFF2-40B4-BE49-F238E27FC236}">
+                <a16:creationId xmlns:a16="http://schemas.microsoft.com/office/drawing/2014/main" id="{707154A5-ADD8-4B2A-8440-D9F053DDAFCC}"/>
+              </a:ext>
+            </a:extLst>
+          </p:cNvPr>
           <p:cNvSpPr>
             <a:spLocks noGrp="1"/>
           </p:cNvSpPr>
@@ -5131,142 +5810,100 @@
         </p:nvSpPr>
         <p:spPr/>
         <p:txBody>
-          <a:bodyPr>
-            <a:normAutofit fontScale="92500" lnSpcReduction="20000"/>
-          </a:bodyPr>
+          <a:bodyPr/>
           <a:lstStyle/>
           <a:p>
             <a:r>
               <a:rPr lang="en-US" dirty="0"/>
-              <a:t>Undergrad:  James, Witten, Hastie and </a:t>
+              <a:t>Class is simultaneously offered at the graduate and undergraduate level</a:t>
+            </a:r>
+          </a:p>
+          <a:p>
+            <a:r>
+              <a:rPr lang="en-US" dirty="0"/>
+              <a:t>Undergrad EE-UY/CSE-UY 4563:  Intro to Machine Learning</a:t>
+            </a:r>
+          </a:p>
+          <a:p>
+            <a:pPr lvl="1"/>
+            <a:r>
+              <a:rPr lang="en-US" dirty="0"/>
+              <a:t>Covers fundamental algorithms and some analysis</a:t>
+            </a:r>
+          </a:p>
+          <a:p>
+            <a:pPr lvl="1"/>
+            <a:r>
+              <a:rPr lang="en-US" dirty="0"/>
+              <a:t>In depth coverage of software tools including python, Google Cloud, </a:t>
             </a:r>
             <a:r>
               <a:rPr lang="en-US" dirty="0" err="1"/>
-              <a:t>Tibshirani</a:t>
-            </a:r>
-            <a:r>
-              <a:rPr lang="en-US" dirty="0"/>
-              <a:t>, “An Introduction to Statistical Learning”,  </a:t>
-            </a:r>
-          </a:p>
-          <a:p>
-            <a:pPr lvl="1"/>
-            <a:r>
-              <a:rPr lang="en-US" u="sng" dirty="0">
-                <a:hlinkClick r:id="rId2"/>
-              </a:rPr>
-              <a:t>http://www-bcf.usc.edu/~gareth/ISL/ISLR%20First%20Printing.pdf</a:t>
-            </a:r>
-            <a:r>
-              <a:rPr lang="en-US" u="sng" dirty="0"/>
-              <a:t>  </a:t>
-            </a:r>
-          </a:p>
-          <a:p>
-            <a:pPr lvl="1"/>
-            <a:r>
-              <a:rPr lang="en-US" dirty="0"/>
-              <a:t>Very clear explanation of concepts.  </a:t>
-            </a:r>
-          </a:p>
-          <a:p>
-            <a:pPr lvl="1"/>
-            <a:r>
-              <a:rPr lang="en-US" dirty="0"/>
-              <a:t>But examples are in R.  And there is no review of probability</a:t>
-            </a:r>
-          </a:p>
-          <a:p>
-            <a:r>
-              <a:rPr lang="en-US" dirty="0"/>
-              <a:t>Grad:  Hastie, </a:t>
-            </a:r>
-            <a:r>
-              <a:rPr lang="en-US" dirty="0" err="1"/>
-              <a:t>Tibshirani</a:t>
-            </a:r>
-            <a:r>
-              <a:rPr lang="en-US" dirty="0"/>
-              <a:t>, Friedman, “Elements of Statistical Learning”</a:t>
-            </a:r>
-          </a:p>
-          <a:p>
-            <a:pPr lvl="1"/>
-            <a:r>
-              <a:rPr lang="en-US" dirty="0">
-                <a:hlinkClick r:id="rId3"/>
-              </a:rPr>
-              <a:t>https://web.stanford.edu/~hastie/Papers/ESLII.pdf</a:t>
-            </a:r>
-            <a:r>
-              <a:rPr lang="en-US" dirty="0"/>
-              <a:t>  </a:t>
-            </a:r>
-          </a:p>
-          <a:p>
-            <a:pPr lvl="1"/>
-            <a:r>
-              <a:rPr lang="en-US" dirty="0"/>
-              <a:t>More advanced text with more analysis</a:t>
-            </a:r>
-          </a:p>
-          <a:p>
-            <a:r>
-              <a:rPr lang="en-US" dirty="0" err="1"/>
-              <a:t>Raschka</a:t>
-            </a:r>
-            <a:r>
-              <a:rPr lang="en-US" dirty="0"/>
-              <a:t>, “Python Machine Learning”, 2015.</a:t>
-            </a:r>
-          </a:p>
-          <a:p>
-            <a:pPr lvl="1"/>
-            <a:r>
-              <a:rPr lang="en-US" u="sng" dirty="0">
-                <a:hlinkClick r:id="rId4"/>
-              </a:rPr>
-              <a:t>http://file.allitebooks.com/20151017/Python%20Machine%20Learning.pdf</a:t>
-            </a:r>
-            <a:endParaRPr lang="en-US" u="sng" dirty="0"/>
-          </a:p>
-          <a:p>
-            <a:pPr lvl="1"/>
-            <a:r>
-              <a:rPr lang="en-US" dirty="0"/>
-              <a:t>Excellent examples of using Python</a:t>
-            </a:r>
-          </a:p>
-          <a:p>
-            <a:r>
-              <a:rPr lang="en-US" dirty="0"/>
-              <a:t>Bishop, “Pattern Recognition and Machine Learning”  (more advanced)</a:t>
-            </a:r>
-          </a:p>
-          <a:p>
-            <a:r>
-              <a:rPr lang="en-US" dirty="0"/>
-              <a:t>Coursera course:  Generally do not cover probability</a:t>
-            </a:r>
-          </a:p>
-          <a:p>
-            <a:r>
-              <a:rPr lang="en-US" dirty="0"/>
-              <a:t>Undergrad probability </a:t>
-            </a:r>
-          </a:p>
-          <a:p>
-            <a:endParaRPr lang="en-US" dirty="0"/>
-          </a:p>
-          <a:p>
-            <a:pPr lvl="1"/>
-            <a:endParaRPr lang="en-US" dirty="0"/>
-          </a:p>
-        </p:txBody>
-      </p:sp>
-      <p:sp>
-        <p:nvSpPr>
-          <p:cNvPr id="4" name="Slide Number Placeholder 3"/>
+              <a:t>Tensorflow</a:t>
+            </a:r>
+            <a:endParaRPr lang="en-US" dirty="0"/>
+          </a:p>
+          <a:p>
+            <a:pPr lvl="1"/>
+            <a:r>
+              <a:rPr lang="en-US" dirty="0"/>
+              <a:t>Python-based lab exercises + mandatory project</a:t>
+            </a:r>
+          </a:p>
+          <a:p>
+            <a:r>
+              <a:rPr lang="en-US" dirty="0"/>
+              <a:t>Grad EL 9123:  Intro to Machine Learning</a:t>
+            </a:r>
+          </a:p>
+          <a:p>
+            <a:pPr lvl="1"/>
+            <a:r>
+              <a:rPr lang="en-US" dirty="0"/>
+              <a:t>More algorithms and more mathematical analysis.  Faster paced.</a:t>
+            </a:r>
+          </a:p>
+          <a:p>
+            <a:pPr lvl="1"/>
+            <a:r>
+              <a:rPr lang="en-US" dirty="0"/>
+              <a:t>Software tools must be learned at home.  Less coverage in class</a:t>
+            </a:r>
+          </a:p>
+          <a:p>
+            <a:pPr lvl="1"/>
+            <a:r>
+              <a:rPr lang="en-US" dirty="0"/>
+              <a:t>Python-based lab exercises + optional project</a:t>
+            </a:r>
+          </a:p>
+          <a:p>
+            <a:r>
+              <a:rPr lang="en-US" dirty="0"/>
+              <a:t>Lecture notes are mostly common with supplementary material for grad students indicated</a:t>
+            </a:r>
+          </a:p>
+          <a:p>
+            <a:r>
+              <a:rPr lang="en-US" dirty="0"/>
+              <a:t>Many labs are common</a:t>
+            </a:r>
+          </a:p>
+          <a:p>
+            <a:pPr lvl="1"/>
+            <a:endParaRPr lang="en-US" dirty="0"/>
+          </a:p>
+        </p:txBody>
+      </p:sp>
+      <p:sp>
+        <p:nvSpPr>
+          <p:cNvPr id="4" name="Slide Number Placeholder 3">
+            <a:extLst>
+              <a:ext uri="{FF2B5EF4-FFF2-40B4-BE49-F238E27FC236}">
+                <a16:creationId xmlns:a16="http://schemas.microsoft.com/office/drawing/2014/main" id="{5EAAA473-4A7A-4E56-A0F3-A86B4C64EB21}"/>
+              </a:ext>
+            </a:extLst>
+          </p:cNvPr>
           <p:cNvSpPr>
             <a:spLocks noGrp="1"/>
           </p:cNvSpPr>
@@ -5290,7 +5927,7 @@
     </p:spTree>
     <p:extLst>
       <p:ext uri="{BB962C8B-B14F-4D97-AF65-F5344CB8AC3E}">
-        <p14:creationId xmlns:p14="http://schemas.microsoft.com/office/powerpoint/2010/main" val="3512308562"/>
+        <p14:creationId xmlns:p14="http://schemas.microsoft.com/office/powerpoint/2010/main" val="3747133559"/>
       </p:ext>
     </p:extLst>
   </p:cSld>
@@ -5334,7 +5971,7 @@
           <a:p>
             <a:r>
               <a:rPr lang="en-US" dirty="0"/>
-              <a:t>Pre-Requisites </a:t>
+              <a:t>Texts and Other Resources</a:t>
             </a:r>
           </a:p>
         </p:txBody>
@@ -5352,82 +5989,135 @@
         <p:spPr/>
         <p:txBody>
           <a:bodyPr>
-            <a:normAutofit/>
+            <a:normAutofit fontScale="92500" lnSpcReduction="20000"/>
           </a:bodyPr>
           <a:lstStyle/>
           <a:p>
             <a:r>
               <a:rPr lang="en-US" dirty="0"/>
-              <a:t>Undergrad probability required for both UG and Grad version:</a:t>
-            </a:r>
-          </a:p>
-          <a:p>
-            <a:pPr lvl="1"/>
-            <a:r>
-              <a:rPr lang="en-US" dirty="0"/>
-              <a:t>Basics of random variables, densities, Gaussian distributions, correlation, expectation, </a:t>
-            </a:r>
-            <a:br>
-              <a:rPr lang="en-US" dirty="0"/>
-            </a:br>
-            <a:r>
-              <a:rPr lang="en-US" dirty="0"/>
-              <a:t>conditional densities, Bayes’ theorem</a:t>
-            </a:r>
-          </a:p>
-          <a:p>
-            <a:pPr lvl="1"/>
-            <a:r>
-              <a:rPr lang="en-US" dirty="0"/>
-              <a:t>Will provide a short review</a:t>
-            </a:r>
-          </a:p>
-          <a:p>
-            <a:pPr lvl="1"/>
-            <a:r>
-              <a:rPr lang="en-US" dirty="0"/>
-              <a:t>NYU classes:  Data analysis or Intro Probability are sufficient</a:t>
-            </a:r>
-          </a:p>
-          <a:p>
-            <a:r>
-              <a:rPr lang="en-US" dirty="0"/>
-              <a:t>Calculus and Linear algebra</a:t>
-            </a:r>
-          </a:p>
-          <a:p>
-            <a:pPr lvl="1"/>
-            <a:r>
-              <a:rPr lang="en-US" dirty="0"/>
-              <a:t>Vectors, matrices, partial derivatives, gradients.</a:t>
-            </a:r>
-          </a:p>
-          <a:p>
-            <a:pPr lvl="1"/>
-            <a:r>
-              <a:rPr lang="en-US" dirty="0"/>
-              <a:t>Undergrad class will provide a brief review</a:t>
-            </a:r>
-          </a:p>
-          <a:p>
-            <a:r>
-              <a:rPr lang="en-US" dirty="0"/>
-              <a:t>No machine learning experience is necessary</a:t>
-            </a:r>
-          </a:p>
-          <a:p>
-            <a:pPr lvl="1"/>
-            <a:r>
-              <a:rPr lang="en-US" dirty="0"/>
-              <a:t>If you have ML experience, do NOT take this class.  </a:t>
-            </a:r>
-          </a:p>
-          <a:p>
-            <a:pPr lvl="1"/>
-            <a:r>
-              <a:rPr lang="en-US" dirty="0"/>
-              <a:t>Take Graduate probability (Fall) then Advanced machine learning (Spring)</a:t>
-            </a:r>
+              <a:t>Undergrad:  James, Witten, Hastie and </a:t>
+            </a:r>
+            <a:r>
+              <a:rPr lang="en-US" dirty="0" err="1"/>
+              <a:t>Tibshirani</a:t>
+            </a:r>
+            <a:r>
+              <a:rPr lang="en-US" dirty="0"/>
+              <a:t>, “An Introduction to Statistical Learning”,  </a:t>
+            </a:r>
+          </a:p>
+          <a:p>
+            <a:pPr lvl="1"/>
+            <a:r>
+              <a:rPr lang="en-US" u="sng" dirty="0">
+                <a:hlinkClick r:id="rId2"/>
+              </a:rPr>
+              <a:t>http://www-bcf.usc.edu/~gareth/ISL/ISLR%20First%20Printing.pdf</a:t>
+            </a:r>
+            <a:r>
+              <a:rPr lang="en-US" u="sng" dirty="0"/>
+              <a:t>  </a:t>
+            </a:r>
+          </a:p>
+          <a:p>
+            <a:pPr lvl="1"/>
+            <a:r>
+              <a:rPr lang="en-US" dirty="0"/>
+              <a:t>Very clear explanation of concepts.  </a:t>
+            </a:r>
+          </a:p>
+          <a:p>
+            <a:pPr lvl="1"/>
+            <a:r>
+              <a:rPr lang="en-US" dirty="0"/>
+              <a:t>But examples are in R.  And there is no review of probability</a:t>
+            </a:r>
+          </a:p>
+          <a:p>
+            <a:r>
+              <a:rPr lang="en-US" dirty="0"/>
+              <a:t>Grad:  Hastie, </a:t>
+            </a:r>
+            <a:r>
+              <a:rPr lang="en-US" dirty="0" err="1"/>
+              <a:t>Tibshirani</a:t>
+            </a:r>
+            <a:r>
+              <a:rPr lang="en-US" dirty="0"/>
+              <a:t>, Friedman, “Elements of Statistical Learning”</a:t>
+            </a:r>
+          </a:p>
+          <a:p>
+            <a:pPr lvl="1"/>
+            <a:r>
+              <a:rPr lang="en-US" dirty="0">
+                <a:hlinkClick r:id="rId3"/>
+              </a:rPr>
+              <a:t>https://web.stanford.edu/~hastie/Papers/ESLII.pdf</a:t>
+            </a:r>
+            <a:r>
+              <a:rPr lang="en-US" dirty="0"/>
+              <a:t>  </a:t>
+            </a:r>
+          </a:p>
+          <a:p>
+            <a:pPr lvl="1"/>
+            <a:r>
+              <a:rPr lang="en-US" dirty="0"/>
+              <a:t>More advanced text with more analysis</a:t>
+            </a:r>
+          </a:p>
+          <a:p>
+            <a:r>
+              <a:rPr lang="en-US" dirty="0" err="1"/>
+              <a:t>Raschka</a:t>
+            </a:r>
+            <a:r>
+              <a:rPr lang="en-US" dirty="0"/>
+              <a:t>, “Python Machine Learning”, 2015.</a:t>
+            </a:r>
+          </a:p>
+          <a:p>
+            <a:pPr lvl="1"/>
+            <a:r>
+              <a:rPr lang="en-US" u="sng" dirty="0">
+                <a:hlinkClick r:id="rId4"/>
+              </a:rPr>
+              <a:t>http://file.allitebooks.com/20151017/Python%20Machine%20Learning.pdf</a:t>
+            </a:r>
+            <a:endParaRPr lang="en-US" u="sng" dirty="0"/>
+          </a:p>
+          <a:p>
+            <a:pPr lvl="1"/>
+            <a:r>
+              <a:rPr lang="en-US" dirty="0"/>
+              <a:t>Excellent examples of using Python</a:t>
+            </a:r>
+          </a:p>
+          <a:p>
+            <a:r>
+              <a:rPr lang="en-US" dirty="0"/>
+              <a:t>Bishop, “Pattern Recognition and Machine Learning”  (more advanced)</a:t>
+            </a:r>
+          </a:p>
+          <a:p>
+            <a:r>
+              <a:rPr lang="en-US" dirty="0"/>
+              <a:t>Coursera course:  Generally do not cover probability</a:t>
+            </a:r>
+          </a:p>
+          <a:p>
+            <a:r>
+              <a:rPr lang="en-US" dirty="0"/>
+              <a:t>Undergrad probability </a:t>
+            </a:r>
+          </a:p>
+          <a:p>
+            <a:endParaRPr lang="en-US" dirty="0"/>
+          </a:p>
+          <a:p>
+            <a:pPr lvl="1"/>
+            <a:endParaRPr lang="en-US" dirty="0"/>
           </a:p>
         </p:txBody>
       </p:sp>
@@ -5457,7 +6147,7 @@
     </p:spTree>
     <p:extLst>
       <p:ext uri="{BB962C8B-B14F-4D97-AF65-F5344CB8AC3E}">
-        <p14:creationId xmlns:p14="http://schemas.microsoft.com/office/powerpoint/2010/main" val="1913674990"/>
+        <p14:creationId xmlns:p14="http://schemas.microsoft.com/office/powerpoint/2010/main" val="3512308562"/>
       </p:ext>
     </p:extLst>
   </p:cSld>
@@ -5486,7 +6176,13 @@
       </p:grpSpPr>
       <p:sp>
         <p:nvSpPr>
-          <p:cNvPr id="2" name="Title 1"/>
+          <p:cNvPr id="2" name="Title 1">
+            <a:extLst>
+              <a:ext uri="{FF2B5EF4-FFF2-40B4-BE49-F238E27FC236}">
+                <a16:creationId xmlns:a16="http://schemas.microsoft.com/office/drawing/2014/main" id="{61F32447-AE2C-4D39-A850-A499A78A9303}"/>
+              </a:ext>
+            </a:extLst>
+          </p:cNvPr>
           <p:cNvSpPr>
             <a:spLocks noGrp="1"/>
           </p:cNvSpPr>
@@ -5501,14 +6197,20 @@
           <a:p>
             <a:r>
               <a:rPr lang="en-US" dirty="0"/>
-              <a:t>Pre-Requisites Programming</a:t>
-            </a:r>
-          </a:p>
-        </p:txBody>
-      </p:sp>
-      <p:sp>
-        <p:nvSpPr>
-          <p:cNvPr id="3" name="Content Placeholder 2"/>
+              <a:t>More Resources</a:t>
+            </a:r>
+          </a:p>
+        </p:txBody>
+      </p:sp>
+      <p:sp>
+        <p:nvSpPr>
+          <p:cNvPr id="3" name="Content Placeholder 2">
+            <a:extLst>
+              <a:ext uri="{FF2B5EF4-FFF2-40B4-BE49-F238E27FC236}">
+                <a16:creationId xmlns:a16="http://schemas.microsoft.com/office/drawing/2014/main" id="{3F3E958F-BBA4-4EC9-B3EF-5142FD3AA066}"/>
+              </a:ext>
+            </a:extLst>
+          </p:cNvPr>
           <p:cNvSpPr>
             <a:spLocks noGrp="1"/>
           </p:cNvSpPr>
@@ -5518,144 +6220,110 @@
         </p:nvSpPr>
         <p:spPr/>
         <p:txBody>
-          <a:bodyPr>
-            <a:normAutofit/>
-          </a:bodyPr>
+          <a:bodyPr/>
           <a:lstStyle/>
           <a:p>
             <a:r>
               <a:rPr lang="en-US" dirty="0"/>
-              <a:t>Python</a:t>
-            </a:r>
-          </a:p>
-          <a:p>
-            <a:pPr lvl="1"/>
-            <a:r>
-              <a:rPr lang="en-US" dirty="0"/>
-              <a:t>All labs are in python, similar to object-oriented MATLAB, but many more libraries.  </a:t>
-            </a:r>
-          </a:p>
-          <a:p>
-            <a:pPr lvl="1"/>
-            <a:r>
-              <a:rPr lang="en-US" dirty="0"/>
-              <a:t>And free!</a:t>
-            </a:r>
-          </a:p>
-          <a:p>
-            <a:r>
-              <a:rPr lang="en-US" dirty="0"/>
-              <a:t>What you need to know</a:t>
-            </a:r>
-          </a:p>
-          <a:p>
-            <a:pPr lvl="1"/>
-            <a:r>
-              <a:rPr lang="en-US" dirty="0"/>
-              <a:t>You do not need to know python before class.  But, we will go over it quickly.</a:t>
-            </a:r>
-          </a:p>
-          <a:p>
-            <a:pPr lvl="1"/>
-            <a:r>
-              <a:rPr lang="en-US" dirty="0"/>
-              <a:t>You should have experience in some programming language (</a:t>
+              <a:t>Entertaining and very good deep learning lectures by Siraj </a:t>
             </a:r>
             <a:r>
               <a:rPr lang="en-US" dirty="0" err="1"/>
-              <a:t>eg</a:t>
-            </a:r>
-            <a:r>
-              <a:rPr lang="en-US" dirty="0"/>
-              <a:t>. MATLAB). </a:t>
-            </a:r>
-          </a:p>
-          <a:p>
-            <a:pPr lvl="1"/>
-            <a:r>
-              <a:rPr lang="en-US" dirty="0"/>
-              <a:t>You should know or being willing to learn object oriented programming </a:t>
-            </a:r>
-          </a:p>
-          <a:p>
-            <a:r>
-              <a:rPr lang="en-US" dirty="0"/>
-              <a:t>Resources:</a:t>
-            </a:r>
-          </a:p>
-          <a:p>
-            <a:pPr lvl="1"/>
-            <a:r>
-              <a:rPr lang="en-US" dirty="0"/>
-              <a:t>Installing python and </a:t>
-            </a:r>
-            <a:r>
-              <a:rPr lang="en-US" dirty="0" err="1"/>
-              <a:t>ipython</a:t>
-            </a:r>
-            <a:r>
-              <a:rPr lang="en-US" dirty="0"/>
-              <a:t> notebook (make sure you install Version 3.5)</a:t>
-            </a:r>
-            <a:br>
-              <a:rPr lang="en-US" dirty="0"/>
-            </a:br>
-            <a:r>
-              <a:rPr lang="en-US" u="sng" dirty="0">
+              <a:t>Raval</a:t>
+            </a:r>
+            <a:endParaRPr lang="en-US" dirty="0"/>
+          </a:p>
+          <a:p>
+            <a:pPr lvl="1"/>
+            <a:r>
+              <a:rPr lang="en-US" dirty="0">
                 <a:hlinkClick r:id="rId2"/>
               </a:rPr>
-              <a:t>http://jupyter-notebook-beginner-guide.readthedocs.io/en/latest/index.html</a:t>
-            </a:r>
-            <a:r>
-              <a:rPr lang="en-US" dirty="0"/>
-              <a:t> </a:t>
-            </a:r>
-          </a:p>
-          <a:p>
-            <a:pPr lvl="1"/>
-            <a:r>
-              <a:rPr lang="es-419" dirty="0"/>
-              <a:t>Python tutorial:   </a:t>
-            </a:r>
-            <a:r>
-              <a:rPr lang="es-419" u="sng" dirty="0">
+              <a:t>https://www.youtube.com/channel/UCWN3xxRkmTPmbKwht9FuE5A</a:t>
+            </a:r>
+            <a:endParaRPr lang="en-US" dirty="0"/>
+          </a:p>
+          <a:p>
+            <a:r>
+              <a:rPr lang="en-US" dirty="0" err="1"/>
+              <a:t>Universite</a:t>
+            </a:r>
+            <a:r>
+              <a:rPr lang="en-US" dirty="0"/>
+              <a:t> de Paris labs: </a:t>
+            </a:r>
+          </a:p>
+          <a:p>
+            <a:pPr lvl="1"/>
+            <a:r>
+              <a:rPr lang="en-US" dirty="0">
                 <a:hlinkClick r:id="rId3"/>
               </a:rPr>
-              <a:t>https://docs.python.org/3/tutorial/</a:t>
-            </a:r>
-            <a:r>
-              <a:rPr lang="es-419" dirty="0"/>
-              <a:t> </a:t>
-            </a:r>
-            <a:endParaRPr lang="en-US" dirty="0"/>
-          </a:p>
-          <a:p>
-            <a:pPr lvl="1"/>
-            <a:r>
-              <a:rPr lang="en-US" dirty="0" err="1"/>
-              <a:t>Numpy</a:t>
-            </a:r>
-            <a:r>
-              <a:rPr lang="en-US" dirty="0"/>
-              <a:t>:  </a:t>
-            </a:r>
+              <a:t>https://github.com/m2dsupsdlclass/lectures-labs</a:t>
+            </a:r>
+            <a:endParaRPr lang="en-US" dirty="0"/>
+          </a:p>
+          <a:p>
+            <a:pPr lvl="1"/>
+            <a:r>
+              <a:rPr lang="en-US" dirty="0"/>
+              <a:t>Focus on deep learning</a:t>
+            </a:r>
+          </a:p>
+          <a:p>
+            <a:pPr lvl="1"/>
+            <a:r>
+              <a:rPr lang="en-US" dirty="0"/>
+              <a:t>Similar format to this class</a:t>
+            </a:r>
+          </a:p>
+          <a:p>
+            <a:r>
+              <a:rPr lang="en-US" dirty="0"/>
+              <a:t>Andrew Ng’s machine learning class:</a:t>
+            </a:r>
+          </a:p>
+          <a:p>
+            <a:pPr lvl="1"/>
             <a:r>
               <a:rPr lang="en-US" dirty="0">
                 <a:hlinkClick r:id="rId4"/>
               </a:rPr>
-              <a:t>http://cs231n.github.io/python-numpy-tutorial/</a:t>
-            </a:r>
-            <a:endParaRPr lang="en-US" dirty="0"/>
-          </a:p>
-          <a:p>
-            <a:pPr lvl="1"/>
-            <a:endParaRPr lang="en-US" dirty="0"/>
-          </a:p>
-        </p:txBody>
-      </p:sp>
-      <p:sp>
-        <p:nvSpPr>
-          <p:cNvPr id="4" name="Slide Number Placeholder 3"/>
+              <a:t>https://www.coursera.org/learn/machine-learning</a:t>
+            </a:r>
+            <a:endParaRPr lang="en-US" dirty="0"/>
+          </a:p>
+          <a:p>
+            <a:pPr lvl="1"/>
+            <a:r>
+              <a:rPr lang="en-US" dirty="0"/>
+              <a:t>A little less mathematical than this class</a:t>
+            </a:r>
+          </a:p>
+          <a:p>
+            <a:r>
+              <a:rPr lang="en-US" dirty="0"/>
+              <a:t>Many, many others online…</a:t>
+            </a:r>
+          </a:p>
+          <a:p>
+            <a:endParaRPr lang="en-US" dirty="0"/>
+          </a:p>
+          <a:p>
+            <a:pPr lvl="1"/>
+            <a:endParaRPr lang="en-US" dirty="0"/>
+          </a:p>
+        </p:txBody>
+      </p:sp>
+      <p:sp>
+        <p:nvSpPr>
+          <p:cNvPr id="4" name="Slide Number Placeholder 3">
+            <a:extLst>
+              <a:ext uri="{FF2B5EF4-FFF2-40B4-BE49-F238E27FC236}">
+                <a16:creationId xmlns:a16="http://schemas.microsoft.com/office/drawing/2014/main" id="{94935313-2585-4328-BA40-93AB4AFBFCEE}"/>
+              </a:ext>
+            </a:extLst>
+          </p:cNvPr>
           <p:cNvSpPr>
             <a:spLocks noGrp="1"/>
           </p:cNvSpPr>
@@ -5679,7 +6347,7 @@
     </p:spTree>
     <p:extLst>
       <p:ext uri="{BB962C8B-B14F-4D97-AF65-F5344CB8AC3E}">
-        <p14:creationId xmlns:p14="http://schemas.microsoft.com/office/powerpoint/2010/main" val="1840468307"/>
+        <p14:creationId xmlns:p14="http://schemas.microsoft.com/office/powerpoint/2010/main" val="1819952337"/>
       </p:ext>
     </p:extLst>
   </p:cSld>
@@ -5723,7 +6391,7 @@
           <a:p>
             <a:r>
               <a:rPr lang="en-US" dirty="0"/>
-              <a:t>Grading:  Undergraduate</a:t>
+              <a:t>Pre-Requisites </a:t>
             </a:r>
           </a:p>
         </p:txBody>
@@ -5740,87 +6408,82 @@
         </p:nvSpPr>
         <p:spPr/>
         <p:txBody>
-          <a:bodyPr/>
+          <a:bodyPr>
+            <a:normAutofit/>
+          </a:bodyPr>
           <a:lstStyle/>
           <a:p>
             <a:r>
               <a:rPr lang="en-US" dirty="0"/>
-              <a:t>Midterm 1:  25%, Midterm 2: 25%, Labs, HW: 25%, Final project: 25%</a:t>
-            </a:r>
-          </a:p>
-          <a:p>
-            <a:r>
-              <a:rPr lang="en-US" dirty="0"/>
-              <a:t>Labs:  Simple python exercises</a:t>
-            </a:r>
-          </a:p>
-          <a:p>
-            <a:pPr lvl="1"/>
-            <a:r>
-              <a:rPr lang="en-US" dirty="0"/>
-              <a:t>Given as </a:t>
-            </a:r>
-            <a:r>
-              <a:rPr lang="en-US" dirty="0" err="1"/>
-              <a:t>jupyter</a:t>
-            </a:r>
-            <a:r>
-              <a:rPr lang="en-US" dirty="0"/>
-              <a:t> notebook that you complete.</a:t>
-            </a:r>
-          </a:p>
-          <a:p>
-            <a:r>
-              <a:rPr lang="en-US" dirty="0"/>
-              <a:t>Midterms &amp; final</a:t>
-            </a:r>
-          </a:p>
-          <a:p>
-            <a:pPr lvl="1"/>
-            <a:r>
-              <a:rPr lang="en-US" dirty="0"/>
-              <a:t>Each over approx. 3-4 weeks of material</a:t>
-            </a:r>
-          </a:p>
-          <a:p>
-            <a:pPr lvl="1"/>
-            <a:r>
-              <a:rPr lang="en-US" dirty="0"/>
-              <a:t>Closed book with cheat sheet.  </a:t>
-            </a:r>
-          </a:p>
-          <a:p>
-            <a:pPr lvl="1"/>
-            <a:r>
-              <a:rPr lang="en-US" dirty="0"/>
-              <a:t>Follows homework and quiz problems + some very basic python questions</a:t>
-            </a:r>
-          </a:p>
-          <a:p>
-            <a:r>
-              <a:rPr lang="en-US" dirty="0"/>
-              <a:t>Final project:  </a:t>
-            </a:r>
-          </a:p>
-          <a:p>
-            <a:pPr lvl="1"/>
-            <a:r>
-              <a:rPr lang="en-US" dirty="0"/>
-              <a:t>Use machine learning in some interesting way.</a:t>
-            </a:r>
-          </a:p>
-          <a:p>
-            <a:pPr lvl="1"/>
-            <a:r>
-              <a:rPr lang="en-US" dirty="0"/>
-              <a:t>Must use data and python analysis.</a:t>
-            </a:r>
-          </a:p>
-          <a:p>
-            <a:pPr lvl="1"/>
-            <a:r>
-              <a:rPr lang="en-US" dirty="0"/>
-              <a:t>Provide final report.</a:t>
+              <a:t>Undergrad probability required for both UG and Grad version:</a:t>
+            </a:r>
+          </a:p>
+          <a:p>
+            <a:pPr lvl="1"/>
+            <a:r>
+              <a:rPr lang="en-US" dirty="0"/>
+              <a:t>Basics of random variables, densities, Gaussian distributions, correlation, expectation, </a:t>
+            </a:r>
+            <a:br>
+              <a:rPr lang="en-US" dirty="0"/>
+            </a:br>
+            <a:r>
+              <a:rPr lang="en-US" dirty="0"/>
+              <a:t>conditional densities, Bayes’ theorem</a:t>
+            </a:r>
+          </a:p>
+          <a:p>
+            <a:pPr lvl="1"/>
+            <a:r>
+              <a:rPr lang="en-US" dirty="0"/>
+              <a:t>Will provide a short review</a:t>
+            </a:r>
+          </a:p>
+          <a:p>
+            <a:pPr lvl="1"/>
+            <a:r>
+              <a:rPr lang="en-US" dirty="0"/>
+              <a:t>NYU classes:  Data analysis or Intro Probability are sufficient</a:t>
+            </a:r>
+          </a:p>
+          <a:p>
+            <a:r>
+              <a:rPr lang="en-US" dirty="0"/>
+              <a:t>Calculus and Linear algebra</a:t>
+            </a:r>
+          </a:p>
+          <a:p>
+            <a:pPr lvl="1"/>
+            <a:r>
+              <a:rPr lang="en-US" dirty="0"/>
+              <a:t>Vectors, matrices, partial derivatives, gradients.</a:t>
+            </a:r>
+          </a:p>
+          <a:p>
+            <a:pPr lvl="1"/>
+            <a:r>
+              <a:rPr lang="en-US" dirty="0"/>
+              <a:t>Undergrad class will provide a brief review</a:t>
+            </a:r>
+          </a:p>
+          <a:p>
+            <a:r>
+              <a:rPr lang="en-US" dirty="0"/>
+              <a:t>No machine learning experience is necessary</a:t>
+            </a:r>
+          </a:p>
+          <a:p>
+            <a:pPr lvl="1"/>
+            <a:r>
+              <a:rPr lang="en-US" dirty="0"/>
+              <a:t>If you have ML experience, do NOT take this class.  </a:t>
+            </a:r>
+          </a:p>
+          <a:p>
+            <a:pPr lvl="1"/>
+            <a:r>
+              <a:rPr lang="en-US" dirty="0"/>
+              <a:t>Take Graduate probability (Fall) then Advanced machine learning (Spring)</a:t>
             </a:r>
           </a:p>
         </p:txBody>
@@ -5851,7 +6514,7 @@
     </p:spTree>
     <p:extLst>
       <p:ext uri="{BB962C8B-B14F-4D97-AF65-F5344CB8AC3E}">
-        <p14:creationId xmlns:p14="http://schemas.microsoft.com/office/powerpoint/2010/main" val="2111641996"/>
+        <p14:creationId xmlns:p14="http://schemas.microsoft.com/office/powerpoint/2010/main" val="1913674990"/>
       </p:ext>
     </p:extLst>
   </p:cSld>
@@ -5895,7 +6558,7 @@
           <a:p>
             <a:r>
               <a:rPr lang="en-US" dirty="0"/>
-              <a:t>Grading:  Graduate</a:t>
+              <a:t>Pre-Requisites Programming</a:t>
             </a:r>
           </a:p>
         </p:txBody>
@@ -5919,90 +6582,131 @@
           <a:p>
             <a:r>
               <a:rPr lang="en-US" dirty="0"/>
-              <a:t>Midterm 35%, Final 35%, Labs / HW 30%</a:t>
-            </a:r>
-          </a:p>
-          <a:p>
-            <a:pPr lvl="1"/>
-            <a:r>
-              <a:rPr lang="en-US" dirty="0"/>
-              <a:t>Optional project:  Up to 20%</a:t>
-            </a:r>
-          </a:p>
-          <a:p>
-            <a:r>
-              <a:rPr lang="en-US" dirty="0"/>
-              <a:t>Labs:  Simple python exercises</a:t>
-            </a:r>
-          </a:p>
-          <a:p>
-            <a:pPr lvl="1"/>
-            <a:r>
-              <a:rPr lang="en-US" dirty="0"/>
-              <a:t>Given as </a:t>
+              <a:t>Python</a:t>
+            </a:r>
+          </a:p>
+          <a:p>
+            <a:pPr lvl="1"/>
+            <a:r>
+              <a:rPr lang="en-US" dirty="0"/>
+              <a:t>All labs are in python, similar to object-oriented MATLAB, but many more libraries.  </a:t>
+            </a:r>
+          </a:p>
+          <a:p>
+            <a:pPr lvl="1"/>
+            <a:r>
+              <a:rPr lang="en-US" dirty="0"/>
+              <a:t>And free!</a:t>
+            </a:r>
+          </a:p>
+          <a:p>
+            <a:r>
+              <a:rPr lang="en-US" dirty="0"/>
+              <a:t>What you need to know</a:t>
+            </a:r>
+          </a:p>
+          <a:p>
+            <a:pPr lvl="1"/>
+            <a:r>
+              <a:rPr lang="en-US" dirty="0"/>
+              <a:t>You do not need to know python before class.  But, we will go over it quickly.</a:t>
+            </a:r>
+          </a:p>
+          <a:p>
+            <a:pPr lvl="1"/>
+            <a:r>
+              <a:rPr lang="en-US" dirty="0"/>
+              <a:t>You should have experience in some programming language (</a:t>
             </a:r>
             <a:r>
               <a:rPr lang="en-US" dirty="0" err="1"/>
-              <a:t>jupyter</a:t>
-            </a:r>
-            <a:r>
-              <a:rPr lang="en-US" dirty="0"/>
-              <a:t> notebook that you complete.</a:t>
-            </a:r>
-          </a:p>
-          <a:p>
-            <a:r>
-              <a:rPr lang="en-US" dirty="0"/>
-              <a:t>Midterms &amp; final</a:t>
-            </a:r>
-          </a:p>
-          <a:p>
-            <a:pPr lvl="1"/>
-            <a:r>
-              <a:rPr lang="en-US" dirty="0"/>
-              <a:t>Each over approx. 6-7 weeks</a:t>
-            </a:r>
-          </a:p>
-          <a:p>
-            <a:pPr lvl="1"/>
-            <a:r>
-              <a:rPr lang="en-US" dirty="0"/>
-              <a:t>Open book but no electronic aids.</a:t>
-            </a:r>
-          </a:p>
-          <a:p>
-            <a:pPr lvl="1"/>
-            <a:r>
-              <a:rPr lang="en-US" dirty="0"/>
-              <a:t>Follows homework and quiz problems + some very basic python questions</a:t>
-            </a:r>
-          </a:p>
-          <a:p>
-            <a:r>
-              <a:rPr lang="en-US" dirty="0"/>
-              <a:t>Optional final project:  </a:t>
-            </a:r>
-          </a:p>
-          <a:p>
-            <a:pPr lvl="1"/>
-            <a:r>
-              <a:rPr lang="en-US" dirty="0"/>
-              <a:t>Use machine learning in some interesting way.</a:t>
-            </a:r>
-          </a:p>
-          <a:p>
-            <a:pPr lvl="1"/>
-            <a:r>
-              <a:rPr lang="en-US" dirty="0"/>
-              <a:t>Must use data and python analysis.</a:t>
-            </a:r>
-          </a:p>
-          <a:p>
-            <a:pPr lvl="1"/>
-            <a:r>
-              <a:rPr lang="en-US" dirty="0"/>
-              <a:t>Provide final report.</a:t>
-            </a:r>
+              <a:t>eg</a:t>
+            </a:r>
+            <a:r>
+              <a:rPr lang="en-US" dirty="0"/>
+              <a:t>. MATLAB). </a:t>
+            </a:r>
+          </a:p>
+          <a:p>
+            <a:pPr lvl="1"/>
+            <a:r>
+              <a:rPr lang="en-US" dirty="0"/>
+              <a:t>You should know or being willing to learn object oriented programming </a:t>
+            </a:r>
+          </a:p>
+          <a:p>
+            <a:r>
+              <a:rPr lang="en-US" dirty="0"/>
+              <a:t>Resources:</a:t>
+            </a:r>
+          </a:p>
+          <a:p>
+            <a:pPr lvl="1"/>
+            <a:r>
+              <a:rPr lang="en-US" dirty="0"/>
+              <a:t>Installing python and </a:t>
+            </a:r>
+            <a:r>
+              <a:rPr lang="en-US" dirty="0" err="1"/>
+              <a:t>ipython</a:t>
+            </a:r>
+            <a:r>
+              <a:rPr lang="en-US" dirty="0"/>
+              <a:t> notebook (make sure you install Version 3.6)</a:t>
+            </a:r>
+            <a:br>
+              <a:rPr lang="en-US" dirty="0"/>
+            </a:br>
+            <a:r>
+              <a:rPr lang="en-US" u="sng" dirty="0">
+                <a:hlinkClick r:id="rId2"/>
+              </a:rPr>
+              <a:t>http://jupyter-notebook-beginner-guide.readthedocs.io/en/latest/index.html</a:t>
+            </a:r>
+            <a:r>
+              <a:rPr lang="en-US" dirty="0"/>
+              <a:t> </a:t>
+            </a:r>
+          </a:p>
+          <a:p>
+            <a:pPr lvl="1"/>
+            <a:r>
+              <a:rPr lang="es-419" dirty="0"/>
+              <a:t>Python tutorial:   </a:t>
+            </a:r>
+            <a:r>
+              <a:rPr lang="es-419" u="sng" dirty="0">
+                <a:hlinkClick r:id="rId3"/>
+              </a:rPr>
+              <a:t>https://docs.python.org/3/tutorial/</a:t>
+            </a:r>
+            <a:r>
+              <a:rPr lang="es-419" dirty="0"/>
+              <a:t> </a:t>
+            </a:r>
+            <a:endParaRPr lang="en-US" dirty="0"/>
+          </a:p>
+          <a:p>
+            <a:pPr lvl="1"/>
+            <a:r>
+              <a:rPr lang="en-US" dirty="0" err="1"/>
+              <a:t>Numpy</a:t>
+            </a:r>
+            <a:r>
+              <a:rPr lang="en-US" dirty="0"/>
+              <a:t>:  </a:t>
+            </a:r>
+            <a:r>
+              <a:rPr lang="en-US" dirty="0">
+                <a:hlinkClick r:id="rId4"/>
+              </a:rPr>
+              <a:t>http://cs231n.github.io/python-numpy-tutorial/</a:t>
+            </a:r>
+            <a:endParaRPr lang="en-US" dirty="0"/>
+          </a:p>
+          <a:p>
+            <a:pPr lvl="1"/>
+            <a:endParaRPr lang="en-US" dirty="0"/>
           </a:p>
         </p:txBody>
       </p:sp>
@@ -6032,7 +6736,7 @@
     </p:spTree>
     <p:extLst>
       <p:ext uri="{BB962C8B-B14F-4D97-AF65-F5344CB8AC3E}">
-        <p14:creationId xmlns:p14="http://schemas.microsoft.com/office/powerpoint/2010/main" val="1044182445"/>
+        <p14:creationId xmlns:p14="http://schemas.microsoft.com/office/powerpoint/2010/main" val="1840468307"/>
       </p:ext>
     </p:extLst>
   </p:cSld>
@@ -6076,7 +6780,7 @@
           <a:p>
             <a:r>
               <a:rPr lang="en-US" dirty="0"/>
-              <a:t>Machine Learning Project</a:t>
+              <a:t>Grading:  Undergraduate</a:t>
             </a:r>
           </a:p>
         </p:txBody>
@@ -6093,74 +6797,87 @@
         </p:nvSpPr>
         <p:spPr/>
         <p:txBody>
-          <a:bodyPr>
-            <a:normAutofit/>
-          </a:bodyPr>
+          <a:bodyPr/>
           <a:lstStyle/>
           <a:p>
             <a:r>
               <a:rPr lang="en-US" dirty="0"/>
-              <a:t>Perform an interesting machine learning task of your choice</a:t>
-            </a:r>
-          </a:p>
-          <a:p>
-            <a:r>
-              <a:rPr lang="en-US" dirty="0"/>
-              <a:t>Many possible areas:</a:t>
-            </a:r>
-          </a:p>
-          <a:p>
-            <a:pPr lvl="1"/>
-            <a:r>
-              <a:rPr lang="en-US" dirty="0"/>
-              <a:t>Machine vision, brain-computer interfaces, natural language processing, sentiment analysis, …</a:t>
-            </a:r>
-          </a:p>
-          <a:p>
-            <a:pPr lvl="1"/>
-            <a:r>
-              <a:rPr lang="en-US" dirty="0"/>
-              <a:t>Anything that interests you</a:t>
-            </a:r>
-          </a:p>
-          <a:p>
-            <a:r>
-              <a:rPr lang="en-US" dirty="0"/>
-              <a:t>Use real data</a:t>
-            </a:r>
-          </a:p>
-          <a:p>
-            <a:pPr lvl="1"/>
-            <a:r>
-              <a:rPr lang="en-US" dirty="0"/>
-              <a:t>UCI ML repository</a:t>
-            </a:r>
-          </a:p>
-          <a:p>
-            <a:pPr lvl="1"/>
-            <a:r>
-              <a:rPr lang="en-US" dirty="0"/>
-              <a:t>Google </a:t>
+              <a:t>Midterm 1:  25%, Midterm 2: 25%, Labs, HW: 25%, Final project: 25%</a:t>
+            </a:r>
+          </a:p>
+          <a:p>
+            <a:r>
+              <a:rPr lang="en-US" dirty="0"/>
+              <a:t>Labs:  Simple python exercises</a:t>
+            </a:r>
+          </a:p>
+          <a:p>
+            <a:pPr lvl="1"/>
+            <a:r>
+              <a:rPr lang="en-US" dirty="0"/>
+              <a:t>Given as </a:t>
             </a:r>
             <a:r>
               <a:rPr lang="en-US" dirty="0" err="1"/>
-              <a:t>BigQuery</a:t>
-            </a:r>
-            <a:r>
-              <a:rPr lang="en-US" dirty="0"/>
-              <a:t> data </a:t>
-            </a:r>
-          </a:p>
-          <a:p>
-            <a:r>
-              <a:rPr lang="en-US" dirty="0"/>
-              <a:t>Write code</a:t>
-            </a:r>
-          </a:p>
-          <a:p>
-            <a:r>
-              <a:rPr lang="en-US" dirty="0"/>
-              <a:t>Submission format discussed in class</a:t>
+              <a:t>jupyter</a:t>
+            </a:r>
+            <a:r>
+              <a:rPr lang="en-US" dirty="0"/>
+              <a:t> notebook that you complete.</a:t>
+            </a:r>
+          </a:p>
+          <a:p>
+            <a:r>
+              <a:rPr lang="en-US" dirty="0"/>
+              <a:t>Midterms &amp; final</a:t>
+            </a:r>
+          </a:p>
+          <a:p>
+            <a:pPr lvl="1"/>
+            <a:r>
+              <a:rPr lang="en-US" dirty="0"/>
+              <a:t>Each over approx. 3-4 weeks of material</a:t>
+            </a:r>
+          </a:p>
+          <a:p>
+            <a:pPr lvl="1"/>
+            <a:r>
+              <a:rPr lang="en-US" dirty="0"/>
+              <a:t>Closed book with cheat sheet.  </a:t>
+            </a:r>
+          </a:p>
+          <a:p>
+            <a:pPr lvl="1"/>
+            <a:r>
+              <a:rPr lang="en-US" dirty="0"/>
+              <a:t>Follows homework and quiz problems + some very basic python questions</a:t>
+            </a:r>
+          </a:p>
+          <a:p>
+            <a:r>
+              <a:rPr lang="en-US" dirty="0"/>
+              <a:t>Final project:  </a:t>
+            </a:r>
+          </a:p>
+          <a:p>
+            <a:pPr lvl="1"/>
+            <a:r>
+              <a:rPr lang="en-US" dirty="0"/>
+              <a:t>Use machine learning in some interesting way.</a:t>
+            </a:r>
+          </a:p>
+          <a:p>
+            <a:pPr lvl="1"/>
+            <a:r>
+              <a:rPr lang="en-US" dirty="0"/>
+              <a:t>Must use data and python analysis.</a:t>
+            </a:r>
+          </a:p>
+          <a:p>
+            <a:pPr lvl="1"/>
+            <a:r>
+              <a:rPr lang="en-US" dirty="0"/>
+              <a:t>Provide final report.</a:t>
             </a:r>
           </a:p>
         </p:txBody>
@@ -6191,7 +6908,7 @@
     </p:spTree>
     <p:extLst>
       <p:ext uri="{BB962C8B-B14F-4D97-AF65-F5344CB8AC3E}">
-        <p14:creationId xmlns:p14="http://schemas.microsoft.com/office/powerpoint/2010/main" val="3728933757"/>
+        <p14:creationId xmlns:p14="http://schemas.microsoft.com/office/powerpoint/2010/main" val="2111641996"/>
       </p:ext>
     </p:extLst>
   </p:cSld>

</xml_diff>